<commit_message>
Added a slide on reducing license compatibility concerns
</commit_message>
<xml_diff>
--- a/licensing.pptx
+++ b/licensing.pptx
@@ -5,10 +5,10 @@
     <p:sldMasterId id="2147483935" r:id="rId4"/>
   </p:sldMasterIdLst>
   <p:notesMasterIdLst>
-    <p:notesMasterId r:id="rId43"/>
+    <p:notesMasterId r:id="rId44"/>
   </p:notesMasterIdLst>
   <p:handoutMasterIdLst>
-    <p:handoutMasterId r:id="rId44"/>
+    <p:handoutMasterId r:id="rId45"/>
   </p:handoutMasterIdLst>
   <p:sldIdLst>
     <p:sldId id="256" r:id="rId5"/>
@@ -34,21 +34,22 @@
     <p:sldId id="322" r:id="rId25"/>
     <p:sldId id="319" r:id="rId26"/>
     <p:sldId id="320" r:id="rId27"/>
-    <p:sldId id="272" r:id="rId28"/>
-    <p:sldId id="273" r:id="rId29"/>
-    <p:sldId id="288" r:id="rId30"/>
-    <p:sldId id="282" r:id="rId31"/>
-    <p:sldId id="290" r:id="rId32"/>
-    <p:sldId id="327" r:id="rId33"/>
-    <p:sldId id="328" r:id="rId34"/>
-    <p:sldId id="329" r:id="rId35"/>
-    <p:sldId id="276" r:id="rId36"/>
-    <p:sldId id="275" r:id="rId37"/>
-    <p:sldId id="289" r:id="rId38"/>
-    <p:sldId id="278" r:id="rId39"/>
-    <p:sldId id="324" r:id="rId40"/>
-    <p:sldId id="325" r:id="rId41"/>
-    <p:sldId id="326" r:id="rId42"/>
+    <p:sldId id="332" r:id="rId28"/>
+    <p:sldId id="272" r:id="rId29"/>
+    <p:sldId id="273" r:id="rId30"/>
+    <p:sldId id="288" r:id="rId31"/>
+    <p:sldId id="282" r:id="rId32"/>
+    <p:sldId id="290" r:id="rId33"/>
+    <p:sldId id="327" r:id="rId34"/>
+    <p:sldId id="328" r:id="rId35"/>
+    <p:sldId id="329" r:id="rId36"/>
+    <p:sldId id="276" r:id="rId37"/>
+    <p:sldId id="275" r:id="rId38"/>
+    <p:sldId id="289" r:id="rId39"/>
+    <p:sldId id="278" r:id="rId40"/>
+    <p:sldId id="324" r:id="rId41"/>
+    <p:sldId id="325" r:id="rId42"/>
+    <p:sldId id="326" r:id="rId43"/>
   </p:sldIdLst>
   <p:sldSz cx="12188825" cy="6858000"/>
   <p:notesSz cx="7010400" cy="9296400"/>
@@ -292,7 +293,7 @@
           <a:p>
             <a:fld id="{0B842F42-2CE9-4E35-95C1-410DC08A50B1}" type="datetimeFigureOut">
               <a:rPr lang="en-US" smtClean="0"/>
-              <a:t>7/26/2022</a:t>
+              <a:t>8/1/2022</a:t>
             </a:fld>
             <a:endParaRPr lang="en-US"/>
           </a:p>
@@ -457,7 +458,7 @@
           <a:p>
             <a:fld id="{6F282904-F315-4730-8D91-37D99E141A6F}" type="datetimeFigureOut">
               <a:rPr lang="en-US" smtClean="0"/>
-              <a:t>7/26/2022</a:t>
+              <a:t>8/1/2022</a:t>
             </a:fld>
             <a:endParaRPr lang="en-US"/>
           </a:p>
@@ -8529,7 +8530,13 @@
       </p:grpSpPr>
       <p:sp>
         <p:nvSpPr>
-          <p:cNvPr id="2" name="Title 1"/>
+          <p:cNvPr id="3" name="Title 2">
+            <a:extLst>
+              <a:ext uri="{FF2B5EF4-FFF2-40B4-BE49-F238E27FC236}">
+                <a16:creationId xmlns:a16="http://schemas.microsoft.com/office/drawing/2014/main" id="{77B115E6-192C-4D71-B552-7B05457951ED}"/>
+              </a:ext>
+            </a:extLst>
+          </p:cNvPr>
           <p:cNvSpPr>
             <a:spLocks noGrp="1"/>
           </p:cNvSpPr>
@@ -8539,74 +8546,122 @@
         </p:nvSpPr>
         <p:spPr/>
         <p:txBody>
-          <a:bodyPr>
-            <a:normAutofit/>
-          </a:bodyPr>
+          <a:bodyPr/>
           <a:lstStyle/>
           <a:p>
             <a:r>
               <a:rPr lang="en-US" dirty="0"/>
-              <a:t>Considerations Favoring Open Source</a:t>
+              <a:t>Strategies for Reducing License Compatibility Concerns</a:t>
             </a:r>
           </a:p>
         </p:txBody>
       </p:sp>
       <p:sp>
         <p:nvSpPr>
-          <p:cNvPr id="4" name="Content Placeholder 3"/>
+          <p:cNvPr id="4" name="Content Placeholder 3">
+            <a:extLst>
+              <a:ext uri="{FF2B5EF4-FFF2-40B4-BE49-F238E27FC236}">
+                <a16:creationId xmlns:a16="http://schemas.microsoft.com/office/drawing/2014/main" id="{1D59A199-7E48-4D23-B5B6-1BB75A87AA94}"/>
+              </a:ext>
+            </a:extLst>
+          </p:cNvPr>
           <p:cNvSpPr>
             <a:spLocks noGrp="1"/>
           </p:cNvSpPr>
           <p:nvPr>
-            <p:ph sz="quarter" idx="1"/>
+            <p:ph idx="1"/>
           </p:nvPr>
         </p:nvSpPr>
-        <p:spPr/>
+        <p:spPr>
+          <a:xfrm>
+            <a:off x="365760" y="1165860"/>
+            <a:ext cx="11369809" cy="4047778"/>
+          </a:xfrm>
+        </p:spPr>
         <p:txBody>
-          <a:bodyPr>
-            <a:normAutofit/>
-          </a:bodyPr>
+          <a:bodyPr/>
           <a:lstStyle/>
           <a:p>
             <a:r>
               <a:rPr lang="en-US" dirty="0"/>
-              <a:t>Challenges of managing and archiving the paperwork associated with proprietary licenses</a:t>
-            </a:r>
-          </a:p>
-          <a:p>
-            <a:r>
-              <a:rPr lang="en-US" dirty="0"/>
-              <a:t>Explicit license agreements can inhibit (legal) use of software</a:t>
-            </a:r>
-          </a:p>
-          <a:p>
-            <a:r>
-              <a:rPr lang="en-US" dirty="0"/>
-              <a:t>I want to support peer review and reproducibility in science</a:t>
-            </a:r>
-          </a:p>
-          <a:p>
-            <a:r>
-              <a:rPr lang="en-US" dirty="0"/>
-              <a:t>My sponsor requires that I release my software as open source</a:t>
-            </a:r>
-          </a:p>
-          <a:p>
-            <a:r>
-              <a:rPr lang="en-US" dirty="0"/>
-              <a:t>I believe that the results of publicly-funded research should be publicly available</a:t>
-            </a:r>
-          </a:p>
-          <a:p>
-            <a:r>
-              <a:rPr lang="en-US" dirty="0"/>
-              <a:t>I want to build a self-sustaining community around my software</a:t>
-            </a:r>
-          </a:p>
-          <a:p>
-            <a:endParaRPr lang="en-US" dirty="0"/>
-          </a:p>
-          <a:p>
+              <a:t>Don’t distribute other software packages as part of yours</a:t>
+            </a:r>
+          </a:p>
+          <a:p>
+            <a:pPr lvl="1"/>
+            <a:r>
+              <a:rPr lang="en-US" dirty="0"/>
+              <a:t>Especially if you’re distributing binaries</a:t>
+            </a:r>
+          </a:p>
+          <a:p>
+            <a:pPr lvl="1"/>
+            <a:r>
+              <a:rPr lang="en-US" dirty="0"/>
+              <a:t>If you need to modify other software, try to upstream changes or ship only patches instead</a:t>
+            </a:r>
+          </a:p>
+          <a:p>
+            <a:r>
+              <a:rPr lang="en-US" dirty="0"/>
+              <a:t>Consider the licenses of your immediate software ecosystem</a:t>
+            </a:r>
+          </a:p>
+          <a:p>
+            <a:pPr lvl="1"/>
+            <a:r>
+              <a:rPr lang="en-US" dirty="0"/>
+              <a:t>Your dependencies</a:t>
+            </a:r>
+          </a:p>
+          <a:p>
+            <a:pPr lvl="1"/>
+            <a:r>
+              <a:rPr lang="en-US" dirty="0"/>
+              <a:t>Other software yours is likely to be used with</a:t>
+            </a:r>
+          </a:p>
+          <a:p>
+            <a:pPr lvl="1"/>
+            <a:r>
+              <a:rPr lang="en-US" dirty="0"/>
+              <a:t>Think about how your software interacts with other packages in the ecosystem</a:t>
+            </a:r>
+          </a:p>
+          <a:p>
+            <a:pPr lvl="2"/>
+            <a:r>
+              <a:rPr lang="en-US" dirty="0"/>
+              <a:t>Recall earlier discussion of the different definitions of “derived work” for different licenses</a:t>
+            </a:r>
+          </a:p>
+          <a:p>
+            <a:r>
+              <a:rPr lang="en-US" dirty="0"/>
+              <a:t>Consider the licensing practices of the community or target audience</a:t>
+            </a:r>
+          </a:p>
+          <a:p>
+            <a:r>
+              <a:rPr lang="en-US" dirty="0"/>
+              <a:t>Permissive licenses tend to have fewer compatibility problems</a:t>
+            </a:r>
+          </a:p>
+          <a:p>
+            <a:r>
+              <a:rPr lang="en-US" dirty="0"/>
+              <a:t>Consider relicensing your software</a:t>
+            </a:r>
+          </a:p>
+          <a:p>
+            <a:pPr lvl="1"/>
+            <a:r>
+              <a:rPr lang="en-US" dirty="0"/>
+              <a:t>More on this coming up</a:t>
+            </a:r>
+          </a:p>
+          <a:p>
+            <a:pPr lvl="1"/>
             <a:endParaRPr lang="en-US" dirty="0"/>
           </a:p>
         </p:txBody>
@@ -8614,7 +8669,7 @@
     </p:spTree>
     <p:extLst>
       <p:ext uri="{BB962C8B-B14F-4D97-AF65-F5344CB8AC3E}">
-        <p14:creationId xmlns:p14="http://schemas.microsoft.com/office/powerpoint/2010/main" val="2105999154"/>
+        <p14:creationId xmlns:p14="http://schemas.microsoft.com/office/powerpoint/2010/main" val="658135198"/>
       </p:ext>
     </p:extLst>
   </p:cSld>
@@ -8660,7 +8715,7 @@
           <a:p>
             <a:r>
               <a:rPr lang="en-US" dirty="0"/>
-              <a:t>A Few More Points About our Real-World Example</a:t>
+              <a:t>Considerations Favoring Open Source</a:t>
             </a:r>
           </a:p>
         </p:txBody>
@@ -8675,104 +8730,60 @@
             <p:ph sz="quarter" idx="1"/>
           </p:nvPr>
         </p:nvSpPr>
-        <p:spPr>
-          <a:xfrm>
-            <a:off x="780394" y="1159933"/>
-            <a:ext cx="10548006" cy="4665133"/>
-          </a:xfrm>
-        </p:spPr>
+        <p:spPr/>
         <p:txBody>
           <a:bodyPr>
-            <a:noAutofit/>
+            <a:normAutofit/>
           </a:bodyPr>
           <a:lstStyle/>
           <a:p>
-            <a:pPr marL="0" indent="0">
-              <a:buNone/>
-            </a:pPr>
-            <a:r>
-              <a:rPr lang="en-US" sz="2200" dirty="0"/>
-              <a:t>In order to acquire access to the code sources, the recipient agrees: </a:t>
-            </a:r>
-          </a:p>
-          <a:p>
-            <a:pPr marL="282575" indent="-282575">
-              <a:buFont typeface="+mj-lt"/>
-              <a:buAutoNum type="arabicPeriod"/>
-            </a:pPr>
-            <a:r>
-              <a:rPr lang="en-US" sz="2200" dirty="0"/>
-              <a:t>to compile/use the XYZZY source code AS IS without modification; </a:t>
-            </a:r>
-            <a:r>
-              <a:rPr lang="en-US" sz="2200" dirty="0">
-                <a:solidFill>
-                  <a:schemeClr val="bg1">
-                    <a:lumMod val="50000"/>
-                  </a:schemeClr>
-                </a:solidFill>
-              </a:rPr>
-              <a:t>users however are welcome to request changes, or to contribute modifications subject to approval of the authors; </a:t>
-            </a:r>
-          </a:p>
-          <a:p>
-            <a:pPr marL="282575" indent="-282575">
-              <a:buFont typeface="+mj-lt"/>
-              <a:buAutoNum type="arabicPeriod"/>
-            </a:pPr>
-            <a:r>
-              <a:rPr lang="en-US" sz="2200" dirty="0">
-                <a:solidFill>
-                  <a:schemeClr val="bg1">
-                    <a:lumMod val="50000"/>
-                  </a:schemeClr>
-                </a:solidFill>
-              </a:rPr>
-              <a:t>if the copy of the XYZZY downloaded by the authorized user is made available to third parties, to ensure that the user agreement is followed by the third parties;</a:t>
-            </a:r>
-          </a:p>
-          <a:p>
-            <a:pPr marL="282575" indent="-282575">
-              <a:buFont typeface="+mj-lt"/>
-              <a:buAutoNum type="arabicPeriod"/>
-            </a:pPr>
-            <a:r>
-              <a:rPr lang="en-US" sz="2200" dirty="0">
-                <a:solidFill>
-                  <a:schemeClr val="bg1">
-                    <a:lumMod val="50000"/>
-                  </a:schemeClr>
-                </a:solidFill>
-              </a:rPr>
-              <a:t>to send a one-time email to xyzzy@example.com describing planned research using that module </a:t>
-            </a:r>
-          </a:p>
-          <a:p>
-            <a:pPr marL="282575" indent="-282575">
-              <a:buFont typeface="+mj-lt"/>
-              <a:buAutoNum type="arabicPeriod"/>
-            </a:pPr>
-            <a:r>
-              <a:rPr lang="en-US" sz="2200" dirty="0"/>
-              <a:t>prior to publication, to email a draft of the article/letter/note to xyzzy@example.com </a:t>
-            </a:r>
-          </a:p>
-          <a:p>
-            <a:pPr marL="282575" indent="-282575">
-              <a:buFont typeface="+mj-lt"/>
-              <a:buAutoNum type="arabicPeriod"/>
-            </a:pPr>
-            <a:r>
-              <a:rPr lang="en-US" sz="2200" dirty="0"/>
-              <a:t>to include in published results or presentations the proper code name(s) and appropriate references.</a:t>
-            </a:r>
+            <a:r>
+              <a:rPr lang="en-US" dirty="0"/>
+              <a:t>Challenges of managing and archiving the paperwork associated with proprietary licenses</a:t>
+            </a:r>
+          </a:p>
+          <a:p>
+            <a:r>
+              <a:rPr lang="en-US" dirty="0"/>
+              <a:t>Explicit license agreements can inhibit (legal) use of software</a:t>
+            </a:r>
+          </a:p>
+          <a:p>
+            <a:r>
+              <a:rPr lang="en-US" dirty="0"/>
+              <a:t>I want to support peer review and reproducibility in science</a:t>
+            </a:r>
+          </a:p>
+          <a:p>
+            <a:r>
+              <a:rPr lang="en-US" dirty="0"/>
+              <a:t>My sponsor requires that I release my software as open source</a:t>
+            </a:r>
+          </a:p>
+          <a:p>
+            <a:r>
+              <a:rPr lang="en-US" dirty="0"/>
+              <a:t>I believe that the results of publicly-funded research should be publicly available</a:t>
+            </a:r>
+          </a:p>
+          <a:p>
+            <a:r>
+              <a:rPr lang="en-US" dirty="0"/>
+              <a:t>I want to build a self-sustaining community around my software</a:t>
+            </a:r>
+          </a:p>
+          <a:p>
+            <a:endParaRPr lang="en-US" dirty="0"/>
+          </a:p>
+          <a:p>
+            <a:endParaRPr lang="en-US" dirty="0"/>
           </a:p>
         </p:txBody>
       </p:sp>
     </p:spTree>
     <p:extLst>
       <p:ext uri="{BB962C8B-B14F-4D97-AF65-F5344CB8AC3E}">
-        <p14:creationId xmlns:p14="http://schemas.microsoft.com/office/powerpoint/2010/main" val="3367293683"/>
+        <p14:creationId xmlns:p14="http://schemas.microsoft.com/office/powerpoint/2010/main" val="2105999154"/>
       </p:ext>
     </p:extLst>
   </p:cSld>
@@ -8817,12 +8828,8 @@
           <a:lstStyle/>
           <a:p>
             <a:r>
-              <a:rPr lang="en-US" dirty="0">
-                <a:solidFill>
-                  <a:schemeClr val="accent1"/>
-                </a:solidFill>
-              </a:rPr>
-              <a:t>Why are these Clauses Included?</a:t>
+              <a:rPr lang="en-US" dirty="0"/>
+              <a:t>A Few More Points About our Real-World Example</a:t>
             </a:r>
           </a:p>
         </p:txBody>
@@ -8849,6 +8856,168 @@
           </a:bodyPr>
           <a:lstStyle/>
           <a:p>
+            <a:pPr marL="0" indent="0">
+              <a:buNone/>
+            </a:pPr>
+            <a:r>
+              <a:rPr lang="en-US" sz="2200" dirty="0"/>
+              <a:t>In order to acquire access to the code sources, the recipient agrees: </a:t>
+            </a:r>
+          </a:p>
+          <a:p>
+            <a:pPr marL="282575" indent="-282575">
+              <a:buFont typeface="+mj-lt"/>
+              <a:buAutoNum type="arabicPeriod"/>
+            </a:pPr>
+            <a:r>
+              <a:rPr lang="en-US" sz="2200" dirty="0"/>
+              <a:t>to compile/use the XYZZY source code AS IS without modification; </a:t>
+            </a:r>
+            <a:r>
+              <a:rPr lang="en-US" sz="2200" dirty="0">
+                <a:solidFill>
+                  <a:schemeClr val="bg1">
+                    <a:lumMod val="50000"/>
+                  </a:schemeClr>
+                </a:solidFill>
+              </a:rPr>
+              <a:t>users however are welcome to request changes, or to contribute modifications subject to approval of the authors; </a:t>
+            </a:r>
+          </a:p>
+          <a:p>
+            <a:pPr marL="282575" indent="-282575">
+              <a:buFont typeface="+mj-lt"/>
+              <a:buAutoNum type="arabicPeriod"/>
+            </a:pPr>
+            <a:r>
+              <a:rPr lang="en-US" sz="2200" dirty="0">
+                <a:solidFill>
+                  <a:schemeClr val="bg1">
+                    <a:lumMod val="50000"/>
+                  </a:schemeClr>
+                </a:solidFill>
+              </a:rPr>
+              <a:t>if the copy of the XYZZY downloaded by the authorized user is made available to third parties, to ensure that the user agreement is followed by the third parties;</a:t>
+            </a:r>
+          </a:p>
+          <a:p>
+            <a:pPr marL="282575" indent="-282575">
+              <a:buFont typeface="+mj-lt"/>
+              <a:buAutoNum type="arabicPeriod"/>
+            </a:pPr>
+            <a:r>
+              <a:rPr lang="en-US" sz="2200" dirty="0">
+                <a:solidFill>
+                  <a:schemeClr val="bg1">
+                    <a:lumMod val="50000"/>
+                  </a:schemeClr>
+                </a:solidFill>
+              </a:rPr>
+              <a:t>to send a one-time email to xyzzy@example.com describing planned research using that module </a:t>
+            </a:r>
+          </a:p>
+          <a:p>
+            <a:pPr marL="282575" indent="-282575">
+              <a:buFont typeface="+mj-lt"/>
+              <a:buAutoNum type="arabicPeriod"/>
+            </a:pPr>
+            <a:r>
+              <a:rPr lang="en-US" sz="2200" dirty="0"/>
+              <a:t>prior to publication, to email a draft of the article/letter/note to xyzzy@example.com </a:t>
+            </a:r>
+          </a:p>
+          <a:p>
+            <a:pPr marL="282575" indent="-282575">
+              <a:buFont typeface="+mj-lt"/>
+              <a:buAutoNum type="arabicPeriod"/>
+            </a:pPr>
+            <a:r>
+              <a:rPr lang="en-US" sz="2200" dirty="0"/>
+              <a:t>to include in published results or presentations the proper code name(s) and appropriate references.</a:t>
+            </a:r>
+          </a:p>
+        </p:txBody>
+      </p:sp>
+    </p:spTree>
+    <p:extLst>
+      <p:ext uri="{BB962C8B-B14F-4D97-AF65-F5344CB8AC3E}">
+        <p14:creationId xmlns:p14="http://schemas.microsoft.com/office/powerpoint/2010/main" val="3367293683"/>
+      </p:ext>
+    </p:extLst>
+  </p:cSld>
+  <p:clrMapOvr>
+    <a:masterClrMapping/>
+  </p:clrMapOvr>
+</p:sld>
+</file>
+
+<file path=ppt/slides/slide27.xml><?xml version="1.0" encoding="utf-8"?>
+<p:sld xmlns:a="http://schemas.openxmlformats.org/drawingml/2006/main" xmlns:r="http://schemas.openxmlformats.org/officeDocument/2006/relationships" xmlns:p="http://schemas.openxmlformats.org/presentationml/2006/main">
+  <p:cSld>
+    <p:spTree>
+      <p:nvGrpSpPr>
+        <p:cNvPr id="1" name=""/>
+        <p:cNvGrpSpPr/>
+        <p:nvPr/>
+      </p:nvGrpSpPr>
+      <p:grpSpPr>
+        <a:xfrm>
+          <a:off x="0" y="0"/>
+          <a:ext cx="0" cy="0"/>
+          <a:chOff x="0" y="0"/>
+          <a:chExt cx="0" cy="0"/>
+        </a:xfrm>
+      </p:grpSpPr>
+      <p:sp>
+        <p:nvSpPr>
+          <p:cNvPr id="2" name="Title 1"/>
+          <p:cNvSpPr>
+            <a:spLocks noGrp="1"/>
+          </p:cNvSpPr>
+          <p:nvPr>
+            <p:ph type="title"/>
+          </p:nvPr>
+        </p:nvSpPr>
+        <p:spPr/>
+        <p:txBody>
+          <a:bodyPr>
+            <a:normAutofit/>
+          </a:bodyPr>
+          <a:lstStyle/>
+          <a:p>
+            <a:r>
+              <a:rPr lang="en-US" dirty="0">
+                <a:solidFill>
+                  <a:schemeClr val="accent1"/>
+                </a:solidFill>
+              </a:rPr>
+              <a:t>Why are these Clauses Included?</a:t>
+            </a:r>
+          </a:p>
+        </p:txBody>
+      </p:sp>
+      <p:sp>
+        <p:nvSpPr>
+          <p:cNvPr id="4" name="Content Placeholder 3"/>
+          <p:cNvSpPr>
+            <a:spLocks noGrp="1"/>
+          </p:cNvSpPr>
+          <p:nvPr>
+            <p:ph sz="quarter" idx="1"/>
+          </p:nvPr>
+        </p:nvSpPr>
+        <p:spPr>
+          <a:xfrm>
+            <a:off x="780394" y="1159933"/>
+            <a:ext cx="10548006" cy="4665133"/>
+          </a:xfrm>
+        </p:spPr>
+        <p:txBody>
+          <a:bodyPr>
+            <a:noAutofit/>
+          </a:bodyPr>
+          <a:lstStyle/>
+          <a:p>
             <a:pPr marL="457200" indent="-457200">
               <a:buFont typeface="+mj-lt"/>
               <a:buAutoNum type="arabicPeriod" startAt="4"/>
@@ -9007,7 +9176,7 @@
 </p:sld>
 </file>
 
-<file path=ppt/slides/slide27.xml><?xml version="1.0" encoding="utf-8"?>
+<file path=ppt/slides/slide28.xml><?xml version="1.0" encoding="utf-8"?>
 <p:sld xmlns:a="http://schemas.openxmlformats.org/drawingml/2006/main" xmlns:r="http://schemas.openxmlformats.org/officeDocument/2006/relationships" xmlns:p="http://schemas.openxmlformats.org/presentationml/2006/main">
   <p:cSld>
     <p:spTree>
@@ -9070,7 +9239,7 @@
 </p:sld>
 </file>
 
-<file path=ppt/slides/slide28.xml><?xml version="1.0" encoding="utf-8"?>
+<file path=ppt/slides/slide29.xml><?xml version="1.0" encoding="utf-8"?>
 <p:sld xmlns:a="http://schemas.openxmlformats.org/drawingml/2006/main" xmlns:r="http://schemas.openxmlformats.org/officeDocument/2006/relationships" xmlns:p="http://schemas.openxmlformats.org/presentationml/2006/main">
   <p:cSld>
     <p:spTree>
@@ -9218,137 +9387,6 @@
     <p:extLst>
       <p:ext uri="{BB962C8B-B14F-4D97-AF65-F5344CB8AC3E}">
         <p14:creationId xmlns:p14="http://schemas.microsoft.com/office/powerpoint/2010/main" val="3969556515"/>
-      </p:ext>
-    </p:extLst>
-  </p:cSld>
-  <p:clrMapOvr>
-    <a:masterClrMapping/>
-  </p:clrMapOvr>
-</p:sld>
-</file>
-
-<file path=ppt/slides/slide29.xml><?xml version="1.0" encoding="utf-8"?>
-<p:sld xmlns:a="http://schemas.openxmlformats.org/drawingml/2006/main" xmlns:r="http://schemas.openxmlformats.org/officeDocument/2006/relationships" xmlns:p="http://schemas.openxmlformats.org/presentationml/2006/main">
-  <p:cSld>
-    <p:spTree>
-      <p:nvGrpSpPr>
-        <p:cNvPr id="1" name=""/>
-        <p:cNvGrpSpPr/>
-        <p:nvPr/>
-      </p:nvGrpSpPr>
-      <p:grpSpPr>
-        <a:xfrm>
-          <a:off x="0" y="0"/>
-          <a:ext cx="0" cy="0"/>
-          <a:chOff x="0" y="0"/>
-          <a:chExt cx="0" cy="0"/>
-        </a:xfrm>
-      </p:grpSpPr>
-      <p:sp>
-        <p:nvSpPr>
-          <p:cNvPr id="2" name="Title 1">
-            <a:extLst>
-              <a:ext uri="{FF2B5EF4-FFF2-40B4-BE49-F238E27FC236}">
-                <a16:creationId xmlns:a16="http://schemas.microsoft.com/office/drawing/2014/main" id="{3F660380-7CAF-0443-A164-422CD5E2C99C}"/>
-              </a:ext>
-            </a:extLst>
-          </p:cNvPr>
-          <p:cNvSpPr>
-            <a:spLocks noGrp="1"/>
-          </p:cNvSpPr>
-          <p:nvPr>
-            <p:ph type="title"/>
-          </p:nvPr>
-        </p:nvSpPr>
-        <p:spPr/>
-        <p:txBody>
-          <a:bodyPr/>
-          <a:lstStyle/>
-          <a:p>
-            <a:r>
-              <a:rPr lang="en-US" dirty="0"/>
-              <a:t>Changing License Example #1</a:t>
-            </a:r>
-          </a:p>
-        </p:txBody>
-      </p:sp>
-      <p:sp>
-        <p:nvSpPr>
-          <p:cNvPr id="3" name="Content Placeholder 2">
-            <a:extLst>
-              <a:ext uri="{FF2B5EF4-FFF2-40B4-BE49-F238E27FC236}">
-                <a16:creationId xmlns:a16="http://schemas.microsoft.com/office/drawing/2014/main" id="{41A558D2-9764-0B4E-88C8-164A32D4B1BA}"/>
-              </a:ext>
-            </a:extLst>
-          </p:cNvPr>
-          <p:cNvSpPr>
-            <a:spLocks noGrp="1"/>
-          </p:cNvSpPr>
-          <p:nvPr>
-            <p:ph idx="1"/>
-          </p:nvPr>
-        </p:nvSpPr>
-        <p:spPr/>
-        <p:txBody>
-          <a:bodyPr/>
-          <a:lstStyle/>
-          <a:p>
-            <a:r>
-              <a:rPr lang="en-US" dirty="0"/>
-              <a:t>Organization owns copyright for several software packages</a:t>
-            </a:r>
-          </a:p>
-          <a:p>
-            <a:pPr lvl="1"/>
-            <a:r>
-              <a:rPr lang="en-US" dirty="0"/>
-              <a:t>Licensed LGPL</a:t>
-            </a:r>
-          </a:p>
-          <a:p>
-            <a:r>
-              <a:rPr lang="en-US" dirty="0"/>
-              <a:t>Authorship agreements were signed at time copyright was asserted</a:t>
-            </a:r>
-          </a:p>
-          <a:p>
-            <a:r>
-              <a:rPr lang="en-US" dirty="0"/>
-              <a:t>Several packages contained third-party source files</a:t>
-            </a:r>
-          </a:p>
-          <a:p>
-            <a:pPr lvl="1"/>
-            <a:r>
-              <a:rPr lang="en-US" dirty="0"/>
-              <a:t>A variety of licenses</a:t>
-            </a:r>
-          </a:p>
-          <a:p>
-            <a:r>
-              <a:rPr lang="en-US" dirty="0"/>
-              <a:t>Many packages received contributions from other authors since initial copyright assertion</a:t>
-            </a:r>
-          </a:p>
-          <a:p>
-            <a:r>
-              <a:rPr lang="en-US" dirty="0"/>
-              <a:t>Many prospective (particularly industry) customers were wary of LGPL</a:t>
-            </a:r>
-          </a:p>
-          <a:p>
-            <a:pPr lvl="1"/>
-            <a:r>
-              <a:rPr lang="en-US" dirty="0"/>
-              <a:t>Decision was made to relicense to BSD</a:t>
-            </a:r>
-          </a:p>
-        </p:txBody>
-      </p:sp>
-    </p:spTree>
-    <p:extLst>
-      <p:ext uri="{BB962C8B-B14F-4D97-AF65-F5344CB8AC3E}">
-        <p14:creationId xmlns:p14="http://schemas.microsoft.com/office/powerpoint/2010/main" val="1032742424"/>
       </p:ext>
     </p:extLst>
   </p:cSld>
@@ -9549,6 +9587,137 @@
           <p:cNvPr id="2" name="Title 1">
             <a:extLst>
               <a:ext uri="{FF2B5EF4-FFF2-40B4-BE49-F238E27FC236}">
+                <a16:creationId xmlns:a16="http://schemas.microsoft.com/office/drawing/2014/main" id="{3F660380-7CAF-0443-A164-422CD5E2C99C}"/>
+              </a:ext>
+            </a:extLst>
+          </p:cNvPr>
+          <p:cNvSpPr>
+            <a:spLocks noGrp="1"/>
+          </p:cNvSpPr>
+          <p:nvPr>
+            <p:ph type="title"/>
+          </p:nvPr>
+        </p:nvSpPr>
+        <p:spPr/>
+        <p:txBody>
+          <a:bodyPr/>
+          <a:lstStyle/>
+          <a:p>
+            <a:r>
+              <a:rPr lang="en-US" dirty="0"/>
+              <a:t>Changing License Example #1</a:t>
+            </a:r>
+          </a:p>
+        </p:txBody>
+      </p:sp>
+      <p:sp>
+        <p:nvSpPr>
+          <p:cNvPr id="3" name="Content Placeholder 2">
+            <a:extLst>
+              <a:ext uri="{FF2B5EF4-FFF2-40B4-BE49-F238E27FC236}">
+                <a16:creationId xmlns:a16="http://schemas.microsoft.com/office/drawing/2014/main" id="{41A558D2-9764-0B4E-88C8-164A32D4B1BA}"/>
+              </a:ext>
+            </a:extLst>
+          </p:cNvPr>
+          <p:cNvSpPr>
+            <a:spLocks noGrp="1"/>
+          </p:cNvSpPr>
+          <p:nvPr>
+            <p:ph idx="1"/>
+          </p:nvPr>
+        </p:nvSpPr>
+        <p:spPr/>
+        <p:txBody>
+          <a:bodyPr/>
+          <a:lstStyle/>
+          <a:p>
+            <a:r>
+              <a:rPr lang="en-US" dirty="0"/>
+              <a:t>Organization owns copyright for several software packages</a:t>
+            </a:r>
+          </a:p>
+          <a:p>
+            <a:pPr lvl="1"/>
+            <a:r>
+              <a:rPr lang="en-US" dirty="0"/>
+              <a:t>Licensed LGPL</a:t>
+            </a:r>
+          </a:p>
+          <a:p>
+            <a:r>
+              <a:rPr lang="en-US" dirty="0"/>
+              <a:t>Authorship agreements were signed at time copyright was asserted</a:t>
+            </a:r>
+          </a:p>
+          <a:p>
+            <a:r>
+              <a:rPr lang="en-US" dirty="0"/>
+              <a:t>Several packages contained third-party source files</a:t>
+            </a:r>
+          </a:p>
+          <a:p>
+            <a:pPr lvl="1"/>
+            <a:r>
+              <a:rPr lang="en-US" dirty="0"/>
+              <a:t>A variety of licenses</a:t>
+            </a:r>
+          </a:p>
+          <a:p>
+            <a:r>
+              <a:rPr lang="en-US" dirty="0"/>
+              <a:t>Many packages received contributions from other authors since initial copyright assertion</a:t>
+            </a:r>
+          </a:p>
+          <a:p>
+            <a:r>
+              <a:rPr lang="en-US" dirty="0"/>
+              <a:t>Many prospective (particularly industry) customers were wary of LGPL</a:t>
+            </a:r>
+          </a:p>
+          <a:p>
+            <a:pPr lvl="1"/>
+            <a:r>
+              <a:rPr lang="en-US" dirty="0"/>
+              <a:t>Decision was made to relicense to BSD</a:t>
+            </a:r>
+          </a:p>
+        </p:txBody>
+      </p:sp>
+    </p:spTree>
+    <p:extLst>
+      <p:ext uri="{BB962C8B-B14F-4D97-AF65-F5344CB8AC3E}">
+        <p14:creationId xmlns:p14="http://schemas.microsoft.com/office/powerpoint/2010/main" val="1032742424"/>
+      </p:ext>
+    </p:extLst>
+  </p:cSld>
+  <p:clrMapOvr>
+    <a:masterClrMapping/>
+  </p:clrMapOvr>
+</p:sld>
+</file>
+
+<file path=ppt/slides/slide31.xml><?xml version="1.0" encoding="utf-8"?>
+<p:sld xmlns:a="http://schemas.openxmlformats.org/drawingml/2006/main" xmlns:r="http://schemas.openxmlformats.org/officeDocument/2006/relationships" xmlns:p="http://schemas.openxmlformats.org/presentationml/2006/main">
+  <p:cSld>
+    <p:spTree>
+      <p:nvGrpSpPr>
+        <p:cNvPr id="1" name=""/>
+        <p:cNvGrpSpPr/>
+        <p:nvPr/>
+      </p:nvGrpSpPr>
+      <p:grpSpPr>
+        <a:xfrm>
+          <a:off x="0" y="0"/>
+          <a:ext cx="0" cy="0"/>
+          <a:chOff x="0" y="0"/>
+          <a:chExt cx="0" cy="0"/>
+        </a:xfrm>
+      </p:grpSpPr>
+      <p:sp>
+        <p:nvSpPr>
+          <p:cNvPr id="2" name="Title 1">
+            <a:extLst>
+              <a:ext uri="{FF2B5EF4-FFF2-40B4-BE49-F238E27FC236}">
                 <a16:creationId xmlns:a16="http://schemas.microsoft.com/office/drawing/2014/main" id="{B56FA8C5-6CE4-F14E-9060-8BDF61678C98}"/>
               </a:ext>
             </a:extLst>
@@ -9665,7 +9834,7 @@
 </p:sld>
 </file>
 
-<file path=ppt/slides/slide31.xml><?xml version="1.0" encoding="utf-8"?>
+<file path=ppt/slides/slide32.xml><?xml version="1.0" encoding="utf-8"?>
 <p:sld xmlns:a="http://schemas.openxmlformats.org/drawingml/2006/main" xmlns:r="http://schemas.openxmlformats.org/officeDocument/2006/relationships" xmlns:p="http://schemas.openxmlformats.org/presentationml/2006/main">
   <p:cSld>
     <p:spTree>
@@ -9777,251 +9946,6 @@
     <p:extLst>
       <p:ext uri="{BB962C8B-B14F-4D97-AF65-F5344CB8AC3E}">
         <p14:creationId xmlns:p14="http://schemas.microsoft.com/office/powerpoint/2010/main" val="4020359728"/>
-      </p:ext>
-    </p:extLst>
-  </p:cSld>
-  <p:clrMapOvr>
-    <a:masterClrMapping/>
-  </p:clrMapOvr>
-</p:sld>
-</file>
-
-<file path=ppt/slides/slide32.xml><?xml version="1.0" encoding="utf-8"?>
-<p:sld xmlns:a="http://schemas.openxmlformats.org/drawingml/2006/main" xmlns:r="http://schemas.openxmlformats.org/officeDocument/2006/relationships" xmlns:p="http://schemas.openxmlformats.org/presentationml/2006/main">
-  <p:cSld>
-    <p:spTree>
-      <p:nvGrpSpPr>
-        <p:cNvPr id="1" name=""/>
-        <p:cNvGrpSpPr/>
-        <p:nvPr/>
-      </p:nvGrpSpPr>
-      <p:grpSpPr>
-        <a:xfrm>
-          <a:off x="0" y="0"/>
-          <a:ext cx="0" cy="0"/>
-          <a:chOff x="0" y="0"/>
-          <a:chExt cx="0" cy="0"/>
-        </a:xfrm>
-      </p:grpSpPr>
-      <p:sp>
-        <p:nvSpPr>
-          <p:cNvPr id="2" name="Title 1"/>
-          <p:cNvSpPr>
-            <a:spLocks noGrp="1"/>
-          </p:cNvSpPr>
-          <p:nvPr>
-            <p:ph type="title"/>
-          </p:nvPr>
-        </p:nvSpPr>
-        <p:spPr/>
-        <p:txBody>
-          <a:bodyPr>
-            <a:normAutofit/>
-          </a:bodyPr>
-          <a:lstStyle/>
-          <a:p>
-            <a:r>
-              <a:rPr lang="en-US" dirty="0"/>
-              <a:t>Accepting Code Contributions</a:t>
-            </a:r>
-          </a:p>
-        </p:txBody>
-      </p:sp>
-      <p:sp>
-        <p:nvSpPr>
-          <p:cNvPr id="4" name="Content Placeholder 3"/>
-          <p:cNvSpPr>
-            <a:spLocks noGrp="1"/>
-          </p:cNvSpPr>
-          <p:nvPr>
-            <p:ph sz="quarter" idx="1"/>
-          </p:nvPr>
-        </p:nvSpPr>
-        <p:spPr>
-          <a:xfrm>
-            <a:off x="663697" y="955307"/>
-            <a:ext cx="11074536" cy="4817533"/>
-          </a:xfrm>
-        </p:spPr>
-        <p:txBody>
-          <a:bodyPr>
-            <a:noAutofit/>
-          </a:bodyPr>
-          <a:lstStyle/>
-          <a:p>
-            <a:r>
-              <a:rPr lang="en-US" sz="2400" dirty="0"/>
-              <a:t>Code contributions are implicitly offered under the current license</a:t>
-            </a:r>
-          </a:p>
-          <a:p>
-            <a:pPr>
-              <a:spcBef>
-                <a:spcPts val="600"/>
-              </a:spcBef>
-            </a:pPr>
-            <a:r>
-              <a:rPr lang="en-US" sz="2400" dirty="0"/>
-              <a:t>Some projects require a contributor agreement</a:t>
-            </a:r>
-          </a:p>
-          <a:p>
-            <a:pPr lvl="1">
-              <a:spcBef>
-                <a:spcPts val="0"/>
-              </a:spcBef>
-            </a:pPr>
-            <a:r>
-              <a:rPr lang="en-US" dirty="0"/>
-              <a:t>Contributor license agreement (CLA) defines the terms between the contributor and the maintainers of the software</a:t>
-            </a:r>
-          </a:p>
-          <a:p>
-            <a:pPr lvl="1">
-              <a:spcBef>
-                <a:spcPts val="200"/>
-              </a:spcBef>
-            </a:pPr>
-            <a:r>
-              <a:rPr lang="en-US" dirty="0"/>
-              <a:t>Contributor transfer agreement (CTA) transfers copyright ownership from contributor to maintainers</a:t>
-            </a:r>
-          </a:p>
-          <a:p>
-            <a:pPr lvl="1">
-              <a:spcBef>
-                <a:spcPts val="200"/>
-              </a:spcBef>
-            </a:pPr>
-            <a:r>
-              <a:rPr lang="en-US" dirty="0"/>
-              <a:t>Developer Certificate of Origin (DCO) has been proposed as an alternative to CLAs</a:t>
-            </a:r>
-          </a:p>
-          <a:p>
-            <a:pPr lvl="2">
-              <a:spcBef>
-                <a:spcPts val="200"/>
-              </a:spcBef>
-            </a:pPr>
-            <a:r>
-              <a:rPr lang="en-US" dirty="0"/>
-              <a:t>Developer asserts that they have permission to submit the code. Not a signed legal contract</a:t>
-            </a:r>
-          </a:p>
-          <a:p>
-            <a:pPr>
-              <a:spcBef>
-                <a:spcPts val="600"/>
-              </a:spcBef>
-            </a:pPr>
-            <a:r>
-              <a:rPr lang="en-US" sz="2400" dirty="0"/>
-              <a:t>Why?</a:t>
-            </a:r>
-          </a:p>
-          <a:p>
-            <a:pPr lvl="1">
-              <a:spcBef>
-                <a:spcPts val="0"/>
-              </a:spcBef>
-            </a:pPr>
-            <a:r>
-              <a:rPr lang="en-US" dirty="0"/>
-              <a:t>Clarify or make explicit terms of contribution (awareness by contributor)</a:t>
-            </a:r>
-          </a:p>
-          <a:p>
-            <a:pPr lvl="1">
-              <a:spcBef>
-                <a:spcPts val="200"/>
-              </a:spcBef>
-            </a:pPr>
-            <a:r>
-              <a:rPr lang="en-US" dirty="0"/>
-              <a:t>Obtain additional rights, e.g., relicensing, patents, etc.</a:t>
-            </a:r>
-          </a:p>
-          <a:p>
-            <a:pPr lvl="1">
-              <a:spcBef>
-                <a:spcPts val="200"/>
-              </a:spcBef>
-            </a:pPr>
-            <a:r>
-              <a:rPr lang="en-US" dirty="0"/>
-              <a:t>Ensure “clear title” to make the contribution</a:t>
-            </a:r>
-          </a:p>
-          <a:p>
-            <a:pPr>
-              <a:spcBef>
-                <a:spcPts val="600"/>
-              </a:spcBef>
-            </a:pPr>
-            <a:r>
-              <a:rPr lang="en-US" sz="2400" dirty="0"/>
-              <a:t>Why not?</a:t>
-            </a:r>
-          </a:p>
-          <a:p>
-            <a:pPr lvl="1">
-              <a:spcBef>
-                <a:spcPts val="200"/>
-              </a:spcBef>
-            </a:pPr>
-            <a:r>
-              <a:rPr lang="en-US" dirty="0"/>
-              <a:t>Creates “barriers to entry” – may discourage potential contributors</a:t>
-            </a:r>
-          </a:p>
-          <a:p>
-            <a:pPr lvl="1">
-              <a:spcBef>
-                <a:spcPts val="200"/>
-              </a:spcBef>
-            </a:pPr>
-            <a:r>
-              <a:rPr lang="en-US" dirty="0"/>
-              <a:t>Legal agreements that may require official review and signature</a:t>
-            </a:r>
-          </a:p>
-          <a:p>
-            <a:pPr lvl="2">
-              <a:spcBef>
-                <a:spcPts val="200"/>
-              </a:spcBef>
-            </a:pPr>
-            <a:r>
-              <a:rPr lang="en-US" dirty="0">
-                <a:solidFill>
-                  <a:schemeClr val="accent1"/>
-                </a:solidFill>
-              </a:rPr>
-              <a:t>Experience: Lost funding for a project because lawyers wouldn’t agree to terms of a CLA</a:t>
-            </a:r>
-          </a:p>
-          <a:p>
-            <a:pPr>
-              <a:spcBef>
-                <a:spcPts val="600"/>
-              </a:spcBef>
-            </a:pPr>
-            <a:r>
-              <a:rPr lang="en-US" sz="2400" dirty="0">
-                <a:solidFill>
-                  <a:schemeClr val="accent1"/>
-                </a:solidFill>
-              </a:rPr>
-              <a:t>See Resources slide for several viewpoints </a:t>
-            </a:r>
-          </a:p>
-        </p:txBody>
-      </p:sp>
-    </p:spTree>
-    <p:extLst>
-      <p:ext uri="{BB962C8B-B14F-4D97-AF65-F5344CB8AC3E}">
-        <p14:creationId xmlns:p14="http://schemas.microsoft.com/office/powerpoint/2010/main" val="2668256845"/>
       </p:ext>
     </p:extLst>
   </p:cSld>
@@ -10067,6 +9991,251 @@
           <a:p>
             <a:r>
               <a:rPr lang="en-US" dirty="0"/>
+              <a:t>Accepting Code Contributions</a:t>
+            </a:r>
+          </a:p>
+        </p:txBody>
+      </p:sp>
+      <p:sp>
+        <p:nvSpPr>
+          <p:cNvPr id="4" name="Content Placeholder 3"/>
+          <p:cNvSpPr>
+            <a:spLocks noGrp="1"/>
+          </p:cNvSpPr>
+          <p:nvPr>
+            <p:ph sz="quarter" idx="1"/>
+          </p:nvPr>
+        </p:nvSpPr>
+        <p:spPr>
+          <a:xfrm>
+            <a:off x="663697" y="955307"/>
+            <a:ext cx="11074536" cy="4817533"/>
+          </a:xfrm>
+        </p:spPr>
+        <p:txBody>
+          <a:bodyPr>
+            <a:noAutofit/>
+          </a:bodyPr>
+          <a:lstStyle/>
+          <a:p>
+            <a:r>
+              <a:rPr lang="en-US" sz="2400" dirty="0"/>
+              <a:t>Code contributions are implicitly offered under the current license</a:t>
+            </a:r>
+          </a:p>
+          <a:p>
+            <a:pPr>
+              <a:spcBef>
+                <a:spcPts val="600"/>
+              </a:spcBef>
+            </a:pPr>
+            <a:r>
+              <a:rPr lang="en-US" sz="2400" dirty="0"/>
+              <a:t>Some projects require a contributor agreement</a:t>
+            </a:r>
+          </a:p>
+          <a:p>
+            <a:pPr lvl="1">
+              <a:spcBef>
+                <a:spcPts val="0"/>
+              </a:spcBef>
+            </a:pPr>
+            <a:r>
+              <a:rPr lang="en-US" dirty="0"/>
+              <a:t>Contributor license agreement (CLA) defines the terms between the contributor and the maintainers of the software</a:t>
+            </a:r>
+          </a:p>
+          <a:p>
+            <a:pPr lvl="1">
+              <a:spcBef>
+                <a:spcPts val="200"/>
+              </a:spcBef>
+            </a:pPr>
+            <a:r>
+              <a:rPr lang="en-US" dirty="0"/>
+              <a:t>Contributor transfer agreement (CTA) transfers copyright ownership from contributor to maintainers</a:t>
+            </a:r>
+          </a:p>
+          <a:p>
+            <a:pPr lvl="1">
+              <a:spcBef>
+                <a:spcPts val="200"/>
+              </a:spcBef>
+            </a:pPr>
+            <a:r>
+              <a:rPr lang="en-US" dirty="0"/>
+              <a:t>Developer Certificate of Origin (DCO) has been proposed as an alternative to CLAs</a:t>
+            </a:r>
+          </a:p>
+          <a:p>
+            <a:pPr lvl="2">
+              <a:spcBef>
+                <a:spcPts val="200"/>
+              </a:spcBef>
+            </a:pPr>
+            <a:r>
+              <a:rPr lang="en-US" dirty="0"/>
+              <a:t>Developer asserts that they have permission to submit the code. Not a signed legal contract</a:t>
+            </a:r>
+          </a:p>
+          <a:p>
+            <a:pPr>
+              <a:spcBef>
+                <a:spcPts val="600"/>
+              </a:spcBef>
+            </a:pPr>
+            <a:r>
+              <a:rPr lang="en-US" sz="2400" dirty="0"/>
+              <a:t>Why?</a:t>
+            </a:r>
+          </a:p>
+          <a:p>
+            <a:pPr lvl="1">
+              <a:spcBef>
+                <a:spcPts val="0"/>
+              </a:spcBef>
+            </a:pPr>
+            <a:r>
+              <a:rPr lang="en-US" dirty="0"/>
+              <a:t>Clarify or make explicit terms of contribution (awareness by contributor)</a:t>
+            </a:r>
+          </a:p>
+          <a:p>
+            <a:pPr lvl="1">
+              <a:spcBef>
+                <a:spcPts val="200"/>
+              </a:spcBef>
+            </a:pPr>
+            <a:r>
+              <a:rPr lang="en-US" dirty="0"/>
+              <a:t>Obtain additional rights, e.g., relicensing, patents, etc.</a:t>
+            </a:r>
+          </a:p>
+          <a:p>
+            <a:pPr lvl="1">
+              <a:spcBef>
+                <a:spcPts val="200"/>
+              </a:spcBef>
+            </a:pPr>
+            <a:r>
+              <a:rPr lang="en-US" dirty="0"/>
+              <a:t>Ensure “clear title” to make the contribution</a:t>
+            </a:r>
+          </a:p>
+          <a:p>
+            <a:pPr>
+              <a:spcBef>
+                <a:spcPts val="600"/>
+              </a:spcBef>
+            </a:pPr>
+            <a:r>
+              <a:rPr lang="en-US" sz="2400" dirty="0"/>
+              <a:t>Why not?</a:t>
+            </a:r>
+          </a:p>
+          <a:p>
+            <a:pPr lvl="1">
+              <a:spcBef>
+                <a:spcPts val="200"/>
+              </a:spcBef>
+            </a:pPr>
+            <a:r>
+              <a:rPr lang="en-US" dirty="0"/>
+              <a:t>Creates “barriers to entry” – may discourage potential contributors</a:t>
+            </a:r>
+          </a:p>
+          <a:p>
+            <a:pPr lvl="1">
+              <a:spcBef>
+                <a:spcPts val="200"/>
+              </a:spcBef>
+            </a:pPr>
+            <a:r>
+              <a:rPr lang="en-US" dirty="0"/>
+              <a:t>Legal agreements that may require official review and signature</a:t>
+            </a:r>
+          </a:p>
+          <a:p>
+            <a:pPr lvl="2">
+              <a:spcBef>
+                <a:spcPts val="200"/>
+              </a:spcBef>
+            </a:pPr>
+            <a:r>
+              <a:rPr lang="en-US" dirty="0">
+                <a:solidFill>
+                  <a:schemeClr val="accent1"/>
+                </a:solidFill>
+              </a:rPr>
+              <a:t>Experience: Lost funding for a project because lawyers wouldn’t agree to terms of a CLA</a:t>
+            </a:r>
+          </a:p>
+          <a:p>
+            <a:pPr>
+              <a:spcBef>
+                <a:spcPts val="600"/>
+              </a:spcBef>
+            </a:pPr>
+            <a:r>
+              <a:rPr lang="en-US" sz="2400" dirty="0">
+                <a:solidFill>
+                  <a:schemeClr val="accent1"/>
+                </a:solidFill>
+              </a:rPr>
+              <a:t>See Resources slide for several viewpoints </a:t>
+            </a:r>
+          </a:p>
+        </p:txBody>
+      </p:sp>
+    </p:spTree>
+    <p:extLst>
+      <p:ext uri="{BB962C8B-B14F-4D97-AF65-F5344CB8AC3E}">
+        <p14:creationId xmlns:p14="http://schemas.microsoft.com/office/powerpoint/2010/main" val="2668256845"/>
+      </p:ext>
+    </p:extLst>
+  </p:cSld>
+  <p:clrMapOvr>
+    <a:masterClrMapping/>
+  </p:clrMapOvr>
+</p:sld>
+</file>
+
+<file path=ppt/slides/slide34.xml><?xml version="1.0" encoding="utf-8"?>
+<p:sld xmlns:a="http://schemas.openxmlformats.org/drawingml/2006/main" xmlns:r="http://schemas.openxmlformats.org/officeDocument/2006/relationships" xmlns:p="http://schemas.openxmlformats.org/presentationml/2006/main">
+  <p:cSld>
+    <p:spTree>
+      <p:nvGrpSpPr>
+        <p:cNvPr id="1" name=""/>
+        <p:cNvGrpSpPr/>
+        <p:nvPr/>
+      </p:nvGrpSpPr>
+      <p:grpSpPr>
+        <a:xfrm>
+          <a:off x="0" y="0"/>
+          <a:ext cx="0" cy="0"/>
+          <a:chOff x="0" y="0"/>
+          <a:chExt cx="0" cy="0"/>
+        </a:xfrm>
+      </p:grpSpPr>
+      <p:sp>
+        <p:nvSpPr>
+          <p:cNvPr id="2" name="Title 1"/>
+          <p:cNvSpPr>
+            <a:spLocks noGrp="1"/>
+          </p:cNvSpPr>
+          <p:nvPr>
+            <p:ph type="title"/>
+          </p:nvPr>
+        </p:nvSpPr>
+        <p:spPr/>
+        <p:txBody>
+          <a:bodyPr>
+            <a:normAutofit/>
+          </a:bodyPr>
+          <a:lstStyle/>
+          <a:p>
+            <a:r>
+              <a:rPr lang="en-US" dirty="0"/>
               <a:t>Managing Copyright Notices in Software</a:t>
             </a:r>
           </a:p>
@@ -10241,7 +10410,7 @@
 </p:sld>
 </file>
 
-<file path=ppt/slides/slide34.xml><?xml version="1.0" encoding="utf-8"?>
+<file path=ppt/slides/slide35.xml><?xml version="1.0" encoding="utf-8"?>
 <p:sld xmlns:a="http://schemas.openxmlformats.org/drawingml/2006/main" xmlns:r="http://schemas.openxmlformats.org/officeDocument/2006/relationships" xmlns:p="http://schemas.openxmlformats.org/presentationml/2006/main">
   <p:cSld>
     <p:spTree>
@@ -10549,7 +10718,7 @@
 </p:sld>
 </file>
 
-<file path=ppt/slides/slide35.xml><?xml version="1.0" encoding="utf-8"?>
+<file path=ppt/slides/slide36.xml><?xml version="1.0" encoding="utf-8"?>
 <p:sld xmlns:a="http://schemas.openxmlformats.org/drawingml/2006/main" xmlns:r="http://schemas.openxmlformats.org/officeDocument/2006/relationships" xmlns:p="http://schemas.openxmlformats.org/presentationml/2006/main">
   <p:cSld>
     <p:spTree>
@@ -10844,216 +11013,6 @@
     <p:extLst>
       <p:ext uri="{BB962C8B-B14F-4D97-AF65-F5344CB8AC3E}">
         <p14:creationId xmlns:p14="http://schemas.microsoft.com/office/powerpoint/2010/main" val="206852533"/>
-      </p:ext>
-    </p:extLst>
-  </p:cSld>
-  <p:clrMapOvr>
-    <a:masterClrMapping/>
-  </p:clrMapOvr>
-</p:sld>
-</file>
-
-<file path=ppt/slides/slide36.xml><?xml version="1.0" encoding="utf-8"?>
-<p:sld xmlns:a="http://schemas.openxmlformats.org/drawingml/2006/main" xmlns:r="http://schemas.openxmlformats.org/officeDocument/2006/relationships" xmlns:p="http://schemas.openxmlformats.org/presentationml/2006/main">
-  <p:cSld>
-    <p:spTree>
-      <p:nvGrpSpPr>
-        <p:cNvPr id="1" name=""/>
-        <p:cNvGrpSpPr/>
-        <p:nvPr/>
-      </p:nvGrpSpPr>
-      <p:grpSpPr>
-        <a:xfrm>
-          <a:off x="0" y="0"/>
-          <a:ext cx="0" cy="0"/>
-          <a:chOff x="0" y="0"/>
-          <a:chExt cx="0" cy="0"/>
-        </a:xfrm>
-      </p:grpSpPr>
-      <p:sp>
-        <p:nvSpPr>
-          <p:cNvPr id="2" name="Title 1">
-            <a:extLst>
-              <a:ext uri="{FF2B5EF4-FFF2-40B4-BE49-F238E27FC236}">
-                <a16:creationId xmlns:a16="http://schemas.microsoft.com/office/drawing/2014/main" id="{FD8F00DC-921E-4C37-88A8-8242F4DEB24D}"/>
-              </a:ext>
-            </a:extLst>
-          </p:cNvPr>
-          <p:cNvSpPr>
-            <a:spLocks noGrp="1"/>
-          </p:cNvSpPr>
-          <p:nvPr>
-            <p:ph type="title"/>
-          </p:nvPr>
-        </p:nvSpPr>
-        <p:spPr/>
-        <p:txBody>
-          <a:bodyPr/>
-          <a:lstStyle/>
-          <a:p>
-            <a:r>
-              <a:rPr lang="en-US" dirty="0"/>
-              <a:t>Additional resources recommended by others (1/3)</a:t>
-            </a:r>
-          </a:p>
-        </p:txBody>
-      </p:sp>
-      <p:sp>
-        <p:nvSpPr>
-          <p:cNvPr id="3" name="Content Placeholder 2">
-            <a:extLst>
-              <a:ext uri="{FF2B5EF4-FFF2-40B4-BE49-F238E27FC236}">
-                <a16:creationId xmlns:a16="http://schemas.microsoft.com/office/drawing/2014/main" id="{1F214064-5F1C-4094-A6EF-4177377FAE6D}"/>
-              </a:ext>
-            </a:extLst>
-          </p:cNvPr>
-          <p:cNvSpPr>
-            <a:spLocks noGrp="1"/>
-          </p:cNvSpPr>
-          <p:nvPr>
-            <p:ph idx="1"/>
-          </p:nvPr>
-        </p:nvSpPr>
-        <p:spPr>
-          <a:xfrm>
-            <a:off x="365760" y="1399434"/>
-            <a:ext cx="11369809" cy="4047778"/>
-          </a:xfrm>
-        </p:spPr>
-        <p:txBody>
-          <a:bodyPr/>
-          <a:lstStyle/>
-          <a:p>
-            <a:pPr marL="0" indent="0">
-              <a:buNone/>
-            </a:pPr>
-            <a:r>
-              <a:rPr lang="en-US" i="1" dirty="0"/>
-              <a:t>I have not yet studied these carefully myself, but I trust the people who recommend them.</a:t>
-            </a:r>
-          </a:p>
-          <a:p>
-            <a:r>
-              <a:rPr lang="en-US" dirty="0">
-                <a:hlinkClick r:id="rId2"/>
-              </a:rPr>
-              <a:t>Neil </a:t>
-            </a:r>
-            <a:r>
-              <a:rPr lang="en-US" dirty="0" err="1">
-                <a:hlinkClick r:id="rId2"/>
-              </a:rPr>
-              <a:t>Chue</a:t>
-            </a:r>
-            <a:r>
-              <a:rPr lang="en-US" dirty="0">
-                <a:hlinkClick r:id="rId2"/>
-              </a:rPr>
-              <a:t> Hong</a:t>
-            </a:r>
-            <a:r>
-              <a:rPr lang="en-US" dirty="0"/>
-              <a:t> (Software Sustainability Institute) from his tutorial </a:t>
-            </a:r>
-            <a:r>
-              <a:rPr lang="en-US" dirty="0">
-                <a:hlinkClick r:id="rId3"/>
-              </a:rPr>
-              <a:t>An Introduction to Software Licensing</a:t>
-            </a:r>
-            <a:r>
-              <a:rPr lang="en-US" dirty="0"/>
-              <a:t> (yes, the same title as this presentation, but developed completely independently)</a:t>
-            </a:r>
-          </a:p>
-          <a:p>
-            <a:pPr lvl="1"/>
-            <a:r>
-              <a:rPr lang="en-US" dirty="0">
-                <a:hlinkClick r:id="rId4"/>
-              </a:rPr>
-              <a:t>The Whys and </a:t>
-            </a:r>
-            <a:r>
-              <a:rPr lang="en-US" dirty="0" err="1">
-                <a:hlinkClick r:id="rId4"/>
-              </a:rPr>
-              <a:t>Hows</a:t>
-            </a:r>
-            <a:r>
-              <a:rPr lang="en-US" dirty="0">
-                <a:hlinkClick r:id="rId4"/>
-              </a:rPr>
-              <a:t> of Licensing Scientific Code</a:t>
-            </a:r>
-            <a:endParaRPr lang="en-US" dirty="0"/>
-          </a:p>
-          <a:p>
-            <a:pPr lvl="1"/>
-            <a:r>
-              <a:rPr lang="en-US" dirty="0">
-                <a:hlinkClick r:id="rId5"/>
-              </a:rPr>
-              <a:t>A Quick Guide to Software Licensing for the Scientist-Programmer</a:t>
-            </a:r>
-            <a:endParaRPr lang="en-US" dirty="0"/>
-          </a:p>
-          <a:p>
-            <a:pPr lvl="1"/>
-            <a:r>
-              <a:rPr lang="en-US" dirty="0">
-                <a:hlinkClick r:id="rId6"/>
-              </a:rPr>
-              <a:t>The Legal Side to Open Source</a:t>
-            </a:r>
-            <a:endParaRPr lang="en-US" dirty="0"/>
-          </a:p>
-          <a:p>
-            <a:pPr lvl="1"/>
-            <a:r>
-              <a:rPr lang="en-US" dirty="0">
-                <a:hlinkClick r:id="rId7"/>
-              </a:rPr>
-              <a:t>The International Free and Open Source Lawbook</a:t>
-            </a:r>
-            <a:endParaRPr lang="en-US" dirty="0"/>
-          </a:p>
-          <a:p>
-            <a:pPr lvl="1"/>
-            <a:r>
-              <a:rPr lang="en-US" dirty="0">
-                <a:hlinkClick r:id="rId8"/>
-              </a:rPr>
-              <a:t>qLegal: advice for tech start-ups + entrepreneurs</a:t>
-            </a:r>
-            <a:endParaRPr lang="en-US" dirty="0"/>
-          </a:p>
-          <a:p>
-            <a:pPr lvl="1"/>
-            <a:r>
-              <a:rPr lang="en-US" dirty="0">
-                <a:hlinkClick r:id="rId9"/>
-              </a:rPr>
-              <a:t>tl;dr legal: Software Licenses in Plain English</a:t>
-            </a:r>
-            <a:endParaRPr lang="en-US" dirty="0"/>
-          </a:p>
-          <a:p>
-            <a:pPr lvl="1"/>
-            <a:r>
-              <a:rPr lang="en-US" dirty="0">
-                <a:hlinkClick r:id="rId10"/>
-              </a:rPr>
-              <a:t>Open Source Software Watch</a:t>
-            </a:r>
-            <a:endParaRPr lang="en-US" dirty="0"/>
-          </a:p>
-        </p:txBody>
-      </p:sp>
-    </p:spTree>
-    <p:extLst>
-      <p:ext uri="{BB962C8B-B14F-4D97-AF65-F5344CB8AC3E}">
-        <p14:creationId xmlns:p14="http://schemas.microsoft.com/office/powerpoint/2010/main" val="2921106656"/>
       </p:ext>
     </p:extLst>
   </p:cSld>
@@ -11103,6 +11062,216 @@
           <a:p>
             <a:r>
               <a:rPr lang="en-US" dirty="0"/>
+              <a:t>Additional resources recommended by others (1/3)</a:t>
+            </a:r>
+          </a:p>
+        </p:txBody>
+      </p:sp>
+      <p:sp>
+        <p:nvSpPr>
+          <p:cNvPr id="3" name="Content Placeholder 2">
+            <a:extLst>
+              <a:ext uri="{FF2B5EF4-FFF2-40B4-BE49-F238E27FC236}">
+                <a16:creationId xmlns:a16="http://schemas.microsoft.com/office/drawing/2014/main" id="{1F214064-5F1C-4094-A6EF-4177377FAE6D}"/>
+              </a:ext>
+            </a:extLst>
+          </p:cNvPr>
+          <p:cNvSpPr>
+            <a:spLocks noGrp="1"/>
+          </p:cNvSpPr>
+          <p:nvPr>
+            <p:ph idx="1"/>
+          </p:nvPr>
+        </p:nvSpPr>
+        <p:spPr>
+          <a:xfrm>
+            <a:off x="365760" y="1399434"/>
+            <a:ext cx="11369809" cy="4047778"/>
+          </a:xfrm>
+        </p:spPr>
+        <p:txBody>
+          <a:bodyPr/>
+          <a:lstStyle/>
+          <a:p>
+            <a:pPr marL="0" indent="0">
+              <a:buNone/>
+            </a:pPr>
+            <a:r>
+              <a:rPr lang="en-US" i="1" dirty="0"/>
+              <a:t>I have not yet studied these carefully myself, but I trust the people who recommend them.</a:t>
+            </a:r>
+          </a:p>
+          <a:p>
+            <a:r>
+              <a:rPr lang="en-US" dirty="0">
+                <a:hlinkClick r:id="rId2"/>
+              </a:rPr>
+              <a:t>Neil </a:t>
+            </a:r>
+            <a:r>
+              <a:rPr lang="en-US" dirty="0" err="1">
+                <a:hlinkClick r:id="rId2"/>
+              </a:rPr>
+              <a:t>Chue</a:t>
+            </a:r>
+            <a:r>
+              <a:rPr lang="en-US" dirty="0">
+                <a:hlinkClick r:id="rId2"/>
+              </a:rPr>
+              <a:t> Hong</a:t>
+            </a:r>
+            <a:r>
+              <a:rPr lang="en-US" dirty="0"/>
+              <a:t> (Software Sustainability Institute) from his tutorial </a:t>
+            </a:r>
+            <a:r>
+              <a:rPr lang="en-US" dirty="0">
+                <a:hlinkClick r:id="rId3"/>
+              </a:rPr>
+              <a:t>An Introduction to Software Licensing</a:t>
+            </a:r>
+            <a:r>
+              <a:rPr lang="en-US" dirty="0"/>
+              <a:t> (yes, the same title as this presentation, but developed completely independently)</a:t>
+            </a:r>
+          </a:p>
+          <a:p>
+            <a:pPr lvl="1"/>
+            <a:r>
+              <a:rPr lang="en-US" dirty="0">
+                <a:hlinkClick r:id="rId4"/>
+              </a:rPr>
+              <a:t>The Whys and </a:t>
+            </a:r>
+            <a:r>
+              <a:rPr lang="en-US" dirty="0" err="1">
+                <a:hlinkClick r:id="rId4"/>
+              </a:rPr>
+              <a:t>Hows</a:t>
+            </a:r>
+            <a:r>
+              <a:rPr lang="en-US" dirty="0">
+                <a:hlinkClick r:id="rId4"/>
+              </a:rPr>
+              <a:t> of Licensing Scientific Code</a:t>
+            </a:r>
+            <a:endParaRPr lang="en-US" dirty="0"/>
+          </a:p>
+          <a:p>
+            <a:pPr lvl="1"/>
+            <a:r>
+              <a:rPr lang="en-US" dirty="0">
+                <a:hlinkClick r:id="rId5"/>
+              </a:rPr>
+              <a:t>A Quick Guide to Software Licensing for the Scientist-Programmer</a:t>
+            </a:r>
+            <a:endParaRPr lang="en-US" dirty="0"/>
+          </a:p>
+          <a:p>
+            <a:pPr lvl="1"/>
+            <a:r>
+              <a:rPr lang="en-US" dirty="0">
+                <a:hlinkClick r:id="rId6"/>
+              </a:rPr>
+              <a:t>The Legal Side to Open Source</a:t>
+            </a:r>
+            <a:endParaRPr lang="en-US" dirty="0"/>
+          </a:p>
+          <a:p>
+            <a:pPr lvl="1"/>
+            <a:r>
+              <a:rPr lang="en-US" dirty="0">
+                <a:hlinkClick r:id="rId7"/>
+              </a:rPr>
+              <a:t>The International Free and Open Source Lawbook</a:t>
+            </a:r>
+            <a:endParaRPr lang="en-US" dirty="0"/>
+          </a:p>
+          <a:p>
+            <a:pPr lvl="1"/>
+            <a:r>
+              <a:rPr lang="en-US" dirty="0">
+                <a:hlinkClick r:id="rId8"/>
+              </a:rPr>
+              <a:t>qLegal: advice for tech start-ups + entrepreneurs</a:t>
+            </a:r>
+            <a:endParaRPr lang="en-US" dirty="0"/>
+          </a:p>
+          <a:p>
+            <a:pPr lvl="1"/>
+            <a:r>
+              <a:rPr lang="en-US" dirty="0">
+                <a:hlinkClick r:id="rId9"/>
+              </a:rPr>
+              <a:t>tl;dr legal: Software Licenses in Plain English</a:t>
+            </a:r>
+            <a:endParaRPr lang="en-US" dirty="0"/>
+          </a:p>
+          <a:p>
+            <a:pPr lvl="1"/>
+            <a:r>
+              <a:rPr lang="en-US" dirty="0">
+                <a:hlinkClick r:id="rId10"/>
+              </a:rPr>
+              <a:t>Open Source Software Watch</a:t>
+            </a:r>
+            <a:endParaRPr lang="en-US" dirty="0"/>
+          </a:p>
+        </p:txBody>
+      </p:sp>
+    </p:spTree>
+    <p:extLst>
+      <p:ext uri="{BB962C8B-B14F-4D97-AF65-F5344CB8AC3E}">
+        <p14:creationId xmlns:p14="http://schemas.microsoft.com/office/powerpoint/2010/main" val="2921106656"/>
+      </p:ext>
+    </p:extLst>
+  </p:cSld>
+  <p:clrMapOvr>
+    <a:masterClrMapping/>
+  </p:clrMapOvr>
+</p:sld>
+</file>
+
+<file path=ppt/slides/slide38.xml><?xml version="1.0" encoding="utf-8"?>
+<p:sld xmlns:a="http://schemas.openxmlformats.org/drawingml/2006/main" xmlns:r="http://schemas.openxmlformats.org/officeDocument/2006/relationships" xmlns:p="http://schemas.openxmlformats.org/presentationml/2006/main">
+  <p:cSld>
+    <p:spTree>
+      <p:nvGrpSpPr>
+        <p:cNvPr id="1" name=""/>
+        <p:cNvGrpSpPr/>
+        <p:nvPr/>
+      </p:nvGrpSpPr>
+      <p:grpSpPr>
+        <a:xfrm>
+          <a:off x="0" y="0"/>
+          <a:ext cx="0" cy="0"/>
+          <a:chOff x="0" y="0"/>
+          <a:chExt cx="0" cy="0"/>
+        </a:xfrm>
+      </p:grpSpPr>
+      <p:sp>
+        <p:nvSpPr>
+          <p:cNvPr id="2" name="Title 1">
+            <a:extLst>
+              <a:ext uri="{FF2B5EF4-FFF2-40B4-BE49-F238E27FC236}">
+                <a16:creationId xmlns:a16="http://schemas.microsoft.com/office/drawing/2014/main" id="{FD8F00DC-921E-4C37-88A8-8242F4DEB24D}"/>
+              </a:ext>
+            </a:extLst>
+          </p:cNvPr>
+          <p:cNvSpPr>
+            <a:spLocks noGrp="1"/>
+          </p:cNvSpPr>
+          <p:nvPr>
+            <p:ph type="title"/>
+          </p:nvPr>
+        </p:nvSpPr>
+        <p:spPr/>
+        <p:txBody>
+          <a:bodyPr/>
+          <a:lstStyle/>
+          <a:p>
+            <a:r>
+              <a:rPr lang="en-US" dirty="0"/>
               <a:t>Additional resources recommended by others (2/3)</a:t>
             </a:r>
           </a:p>
@@ -11300,7 +11469,7 @@
 </p:sld>
 </file>
 
-<file path=ppt/slides/slide38.xml><?xml version="1.0" encoding="utf-8"?>
+<file path=ppt/slides/slide39.xml><?xml version="1.0" encoding="utf-8"?>
 <p:sld xmlns:a="http://schemas.openxmlformats.org/drawingml/2006/main" xmlns:r="http://schemas.openxmlformats.org/officeDocument/2006/relationships" xmlns:p="http://schemas.openxmlformats.org/presentationml/2006/main">
   <p:cSld>
     <p:spTree>
@@ -13854,6 +14023,12 @@
 </file>
 
 <file path=customXml/item1.xml><?xml version="1.0" encoding="utf-8"?>
+<p:properties xmlns:p="http://schemas.microsoft.com/office/2006/metadata/properties" xmlns:xsi="http://www.w3.org/2001/XMLSchema-instance" xmlns:pc="http://schemas.microsoft.com/office/infopath/2007/PartnerControls">
+  <documentManagement/>
+</p:properties>
+</file>
+
+<file path=customXml/item2.xml><?xml version="1.0" encoding="utf-8"?>
 <ct:contentTypeSchema xmlns:ct="http://schemas.microsoft.com/office/2006/metadata/contentType" xmlns:ma="http://schemas.microsoft.com/office/2006/metadata/properties/metaAttributes" ct:_="" ma:_="" ma:contentTypeName="Document" ma:contentTypeID="0x010100565464437F680748A68B85EB6594EA7D" ma:contentTypeVersion="0" ma:contentTypeDescription="Create a new document." ma:contentTypeScope="" ma:versionID="fe3f4dd58d5914c51cfc6deaa8ad845c">
   <xsd:schema xmlns:xsd="http://www.w3.org/2001/XMLSchema" xmlns:p="http://schemas.microsoft.com/office/2006/metadata/properties" targetNamespace="http://schemas.microsoft.com/office/2006/metadata/properties" ma:root="true" ma:fieldsID="4aeb20c0e3442673af7ee10786458764">
     <xsd:element name="properties">
@@ -13902,12 +14077,6 @@
 </ct:contentTypeSchema>
 </file>
 
-<file path=customXml/item2.xml><?xml version="1.0" encoding="utf-8"?>
-<p:properties xmlns:p="http://schemas.microsoft.com/office/2006/metadata/properties" xmlns:xsi="http://www.w3.org/2001/XMLSchema-instance" xmlns:pc="http://schemas.microsoft.com/office/infopath/2007/PartnerControls">
-  <documentManagement/>
-</p:properties>
-</file>
-
 <file path=customXml/item3.xml><?xml version="1.0" encoding="utf-8"?>
 <?mso-contentType ?>
 <FormTemplates xmlns="http://schemas.microsoft.com/sharepoint/v3/contenttype/forms">
@@ -13918,6 +14087,21 @@
 </file>
 
 <file path=customXml/itemProps1.xml><?xml version="1.0" encoding="utf-8"?>
+<ds:datastoreItem xmlns:ds="http://schemas.openxmlformats.org/officeDocument/2006/customXml" ds:itemID="{A50EC660-24D0-43A0-AE5E-E274115E726B}">
+  <ds:schemaRefs>
+    <ds:schemaRef ds:uri="http://purl.org/dc/elements/1.1/"/>
+    <ds:schemaRef ds:uri="http://schemas.microsoft.com/office/2006/metadata/properties"/>
+    <ds:schemaRef ds:uri="http://purl.org/dc/terms/"/>
+    <ds:schemaRef ds:uri="http://schemas.openxmlformats.org/package/2006/metadata/core-properties"/>
+    <ds:schemaRef ds:uri="http://schemas.microsoft.com/office/2006/documentManagement/types"/>
+    <ds:schemaRef ds:uri="http://www.w3.org/XML/1998/namespace"/>
+    <ds:schemaRef ds:uri="http://purl.org/dc/dcmitype/"/>
+    <ds:schemaRef ds:uri="http://schemas.microsoft.com/office/infopath/2007/PartnerControls"/>
+  </ds:schemaRefs>
+</ds:datastoreItem>
+</file>
+
+<file path=customXml/itemProps2.xml><?xml version="1.0" encoding="utf-8"?>
 <ds:datastoreItem xmlns:ds="http://schemas.openxmlformats.org/officeDocument/2006/customXml" ds:itemID="{E8DB7DEB-074E-4EE8-9B6E-FD277323109C}">
   <ds:schemaRefs>
     <ds:schemaRef ds:uri="http://schemas.microsoft.com/office/2006/metadata/contentType"/>
@@ -13932,21 +14116,6 @@
 </ds:datastoreItem>
 </file>
 
-<file path=customXml/itemProps2.xml><?xml version="1.0" encoding="utf-8"?>
-<ds:datastoreItem xmlns:ds="http://schemas.openxmlformats.org/officeDocument/2006/customXml" ds:itemID="{A50EC660-24D0-43A0-AE5E-E274115E726B}">
-  <ds:schemaRefs>
-    <ds:schemaRef ds:uri="http://purl.org/dc/elements/1.1/"/>
-    <ds:schemaRef ds:uri="http://schemas.microsoft.com/office/2006/metadata/properties"/>
-    <ds:schemaRef ds:uri="http://purl.org/dc/terms/"/>
-    <ds:schemaRef ds:uri="http://schemas.openxmlformats.org/package/2006/metadata/core-properties"/>
-    <ds:schemaRef ds:uri="http://schemas.microsoft.com/office/2006/documentManagement/types"/>
-    <ds:schemaRef ds:uri="http://www.w3.org/XML/1998/namespace"/>
-    <ds:schemaRef ds:uri="http://purl.org/dc/dcmitype/"/>
-    <ds:schemaRef ds:uri="http://schemas.microsoft.com/office/infopath/2007/PartnerControls"/>
-  </ds:schemaRefs>
-</ds:datastoreItem>
-</file>
-
 <file path=customXml/itemProps3.xml><?xml version="1.0" encoding="utf-8"?>
 <ds:datastoreItem xmlns:ds="http://schemas.openxmlformats.org/officeDocument/2006/customXml" ds:itemID="{19E20559-B232-4371-8690-E3D8007EDB82}">
   <ds:schemaRefs>

</xml_diff>

<commit_message>
Update link in licensing
</commit_message>
<xml_diff>
--- a/licensing.pptx
+++ b/licensing.pptx
@@ -293,7 +293,7 @@
           <a:p>
             <a:fld id="{0B842F42-2CE9-4E35-95C1-410DC08A50B1}" type="datetimeFigureOut">
               <a:rPr lang="en-US" smtClean="0"/>
-              <a:t>8/9/2022</a:t>
+              <a:t>7/4/2023</a:t>
             </a:fld>
             <a:endParaRPr lang="en-US"/>
           </a:p>
@@ -458,7 +458,7 @@
           <a:p>
             <a:fld id="{6F282904-F315-4730-8D91-37D99E141A6F}" type="datetimeFigureOut">
               <a:rPr lang="en-US" smtClean="0"/>
-              <a:t>8/9/2022</a:t>
+              <a:t>7/4/2023</a:t>
             </a:fld>
             <a:endParaRPr lang="en-US"/>
           </a:p>
@@ -13914,21 +13914,12 @@
 </file>
 
 <file path=customXml/item1.xml><?xml version="1.0" encoding="utf-8"?>
-<?mso-contentType ?>
-<FormTemplates xmlns="http://schemas.microsoft.com/sharepoint/v3/contenttype/forms">
-  <Display>DocumentLibraryForm</Display>
-  <Edit>DocumentLibraryForm</Edit>
-  <New>DocumentLibraryForm</New>
-</FormTemplates>
-</file>
-
-<file path=customXml/item2.xml><?xml version="1.0" encoding="utf-8"?>
 <p:properties xmlns:p="http://schemas.microsoft.com/office/2006/metadata/properties" xmlns:xsi="http://www.w3.org/2001/XMLSchema-instance" xmlns:pc="http://schemas.microsoft.com/office/infopath/2007/PartnerControls">
   <documentManagement/>
 </p:properties>
 </file>
 
-<file path=customXml/item3.xml><?xml version="1.0" encoding="utf-8"?>
+<file path=customXml/item2.xml><?xml version="1.0" encoding="utf-8"?>
 <ct:contentTypeSchema xmlns:ct="http://schemas.microsoft.com/office/2006/metadata/contentType" xmlns:ma="http://schemas.microsoft.com/office/2006/metadata/properties/metaAttributes" ct:_="" ma:_="" ma:contentTypeName="Document" ma:contentTypeID="0x010100565464437F680748A68B85EB6594EA7D" ma:contentTypeVersion="0" ma:contentTypeDescription="Create a new document." ma:contentTypeScope="" ma:versionID="fe3f4dd58d5914c51cfc6deaa8ad845c">
   <xsd:schema xmlns:xsd="http://www.w3.org/2001/XMLSchema" xmlns:p="http://schemas.microsoft.com/office/2006/metadata/properties" targetNamespace="http://schemas.microsoft.com/office/2006/metadata/properties" ma:root="true" ma:fieldsID="4aeb20c0e3442673af7ee10786458764">
     <xsd:element name="properties">
@@ -13977,15 +13968,16 @@
 </ct:contentTypeSchema>
 </file>
 
-<file path=customXml/itemProps1.xml><?xml version="1.0" encoding="utf-8"?>
-<ds:datastoreItem xmlns:ds="http://schemas.openxmlformats.org/officeDocument/2006/customXml" ds:itemID="{19E20559-B232-4371-8690-E3D8007EDB82}">
-  <ds:schemaRefs>
-    <ds:schemaRef ds:uri="http://schemas.microsoft.com/sharepoint/v3/contenttype/forms"/>
-  </ds:schemaRefs>
-</ds:datastoreItem>
+<file path=customXml/item3.xml><?xml version="1.0" encoding="utf-8"?>
+<?mso-contentType ?>
+<FormTemplates xmlns="http://schemas.microsoft.com/sharepoint/v3/contenttype/forms">
+  <Display>DocumentLibraryForm</Display>
+  <Edit>DocumentLibraryForm</Edit>
+  <New>DocumentLibraryForm</New>
+</FormTemplates>
 </file>
 
-<file path=customXml/itemProps2.xml><?xml version="1.0" encoding="utf-8"?>
+<file path=customXml/itemProps1.xml><?xml version="1.0" encoding="utf-8"?>
 <ds:datastoreItem xmlns:ds="http://schemas.openxmlformats.org/officeDocument/2006/customXml" ds:itemID="{A50EC660-24D0-43A0-AE5E-E274115E726B}">
   <ds:schemaRefs>
     <ds:schemaRef ds:uri="http://purl.org/dc/elements/1.1/"/>
@@ -14000,7 +13992,7 @@
 </ds:datastoreItem>
 </file>
 
-<file path=customXml/itemProps3.xml><?xml version="1.0" encoding="utf-8"?>
+<file path=customXml/itemProps2.xml><?xml version="1.0" encoding="utf-8"?>
 <ds:datastoreItem xmlns:ds="http://schemas.openxmlformats.org/officeDocument/2006/customXml" ds:itemID="{E8DB7DEB-074E-4EE8-9B6E-FD277323109C}">
   <ds:schemaRefs>
     <ds:schemaRef ds:uri="http://schemas.microsoft.com/office/2006/metadata/contentType"/>
@@ -14013,4 +14005,12 @@
     <ds:schemaRef ds:uri="http://schemas.microsoft.com/office/internal/2005/internalDocumentation"/>
   </ds:schemaRefs>
 </ds:datastoreItem>
+</file>
+
+<file path=customXml/itemProps3.xml><?xml version="1.0" encoding="utf-8"?>
+<ds:datastoreItem xmlns:ds="http://schemas.openxmlformats.org/officeDocument/2006/customXml" ds:itemID="{19E20559-B232-4371-8690-E3D8007EDB82}">
+  <ds:schemaRefs>
+    <ds:schemaRef ds:uri="http://schemas.microsoft.com/sharepoint/v3/contenttype/forms"/>
+  </ds:schemaRefs>
+</ds:datastoreItem>
 </file>
</xml_diff>